<commit_message>
Test Runs and results
</commit_message>
<xml_diff>
--- a/Report.pptx
+++ b/Report.pptx
@@ -14,6 +14,8 @@
     <p:sldId id="265" r:id="rId8"/>
     <p:sldId id="266" r:id="rId9"/>
     <p:sldId id="267" r:id="rId10"/>
+    <p:sldId id="270" r:id="rId11"/>
+    <p:sldId id="271" r:id="rId12"/>
   </p:sldIdLst>
   <p:sldSz cx="12192000" cy="6858000"/>
   <p:notesSz cx="6858000" cy="9144000"/>
@@ -113,6 +115,14 @@
     </a:lvl9pPr>
   </p:defaultTextStyle>
 </p:presentation>
+</file>
+
+<file path=ppt/revisionInfo.xml><?xml version="1.0" encoding="utf-8"?>
+<p1510:revInfo xmlns:a="http://schemas.openxmlformats.org/drawingml/2006/main" xmlns:r="http://schemas.openxmlformats.org/officeDocument/2006/relationships" xmlns:p1510="http://schemas.microsoft.com/office/powerpoint/2015/10/main">
+  <p1510:revLst>
+    <p1510:client id="{7251B78E-426E-954F-9D58-EEBFE8467C04}" v="2" dt="2024-01-29T09:53:56.403"/>
+  </p1510:revLst>
+</p1510:revInfo>
 </file>
 
 <file path=ppt/charts/chart1.xml><?xml version="1.0" encoding="utf-8"?>
@@ -4333,6 +4343,229 @@
 </p:sld>
 </file>
 
+<file path=ppt/slides/slide10.xml><?xml version="1.0" encoding="utf-8"?>
+<p:sld xmlns:a="http://schemas.openxmlformats.org/drawingml/2006/main" xmlns:r="http://schemas.openxmlformats.org/officeDocument/2006/relationships" xmlns:p="http://schemas.openxmlformats.org/presentationml/2006/main">
+  <p:cSld>
+    <p:spTree>
+      <p:nvGrpSpPr>
+        <p:cNvPr id="1" name=""/>
+        <p:cNvGrpSpPr/>
+        <p:nvPr/>
+      </p:nvGrpSpPr>
+      <p:grpSpPr>
+        <a:xfrm>
+          <a:off x="0" y="0"/>
+          <a:ext cx="0" cy="0"/>
+          <a:chOff x="0" y="0"/>
+          <a:chExt cx="0" cy="0"/>
+        </a:xfrm>
+      </p:grpSpPr>
+      <p:sp>
+        <p:nvSpPr>
+          <p:cNvPr id="2" name="Title 1">
+            <a:extLst>
+              <a:ext uri="{FF2B5EF4-FFF2-40B4-BE49-F238E27FC236}">
+                <a16:creationId xmlns:a16="http://schemas.microsoft.com/office/drawing/2014/main" id="{3423D521-E6F3-21C4-E120-643F6C30F132}"/>
+              </a:ext>
+            </a:extLst>
+          </p:cNvPr>
+          <p:cNvSpPr>
+            <a:spLocks noGrp="1"/>
+          </p:cNvSpPr>
+          <p:nvPr>
+            <p:ph type="title"/>
+          </p:nvPr>
+        </p:nvSpPr>
+        <p:spPr/>
+        <p:txBody>
+          <a:bodyPr/>
+          <a:lstStyle/>
+          <a:p>
+            <a:r>
+              <a:rPr lang="en-US" dirty="0"/>
+              <a:t>Run results</a:t>
+            </a:r>
+          </a:p>
+        </p:txBody>
+      </p:sp>
+      <p:pic>
+        <p:nvPicPr>
+          <p:cNvPr id="7" name="Picture 6" descr="A screenshot of a computer&#10;&#10;Description automatically generated">
+            <a:extLst>
+              <a:ext uri="{FF2B5EF4-FFF2-40B4-BE49-F238E27FC236}">
+                <a16:creationId xmlns:a16="http://schemas.microsoft.com/office/drawing/2014/main" id="{360A7E63-96FD-8325-73ED-EA695AC4E2DE}"/>
+              </a:ext>
+            </a:extLst>
+          </p:cNvPr>
+          <p:cNvPicPr>
+            <a:picLocks noChangeAspect="1"/>
+          </p:cNvPicPr>
+          <p:nvPr/>
+        </p:nvPicPr>
+        <p:blipFill>
+          <a:blip r:embed="rId2"/>
+          <a:stretch>
+            <a:fillRect/>
+          </a:stretch>
+        </p:blipFill>
+        <p:spPr>
+          <a:xfrm>
+            <a:off x="838200" y="1690688"/>
+            <a:ext cx="7772400" cy="4219302"/>
+          </a:xfrm>
+          <a:prstGeom prst="rect">
+            <a:avLst/>
+          </a:prstGeom>
+        </p:spPr>
+      </p:pic>
+      <p:sp>
+        <p:nvSpPr>
+          <p:cNvPr id="9" name="Content Placeholder 8">
+            <a:extLst>
+              <a:ext uri="{FF2B5EF4-FFF2-40B4-BE49-F238E27FC236}">
+                <a16:creationId xmlns:a16="http://schemas.microsoft.com/office/drawing/2014/main" id="{BEE20893-D558-C012-8EA6-4A22CDC13CE8}"/>
+              </a:ext>
+            </a:extLst>
+          </p:cNvPr>
+          <p:cNvSpPr>
+            <a:spLocks noGrp="1"/>
+          </p:cNvSpPr>
+          <p:nvPr>
+            <p:ph idx="1"/>
+          </p:nvPr>
+        </p:nvSpPr>
+        <p:spPr/>
+        <p:txBody>
+          <a:bodyPr/>
+          <a:lstStyle/>
+          <a:p>
+            <a:endParaRPr lang="en-US"/>
+          </a:p>
+        </p:txBody>
+      </p:sp>
+    </p:spTree>
+    <p:extLst>
+      <p:ext uri="{BB962C8B-B14F-4D97-AF65-F5344CB8AC3E}">
+        <p14:creationId xmlns:p14="http://schemas.microsoft.com/office/powerpoint/2010/main" val="4136191569"/>
+      </p:ext>
+    </p:extLst>
+  </p:cSld>
+  <p:clrMapOvr>
+    <a:masterClrMapping/>
+  </p:clrMapOvr>
+</p:sld>
+</file>
+
+<file path=ppt/slides/slide11.xml><?xml version="1.0" encoding="utf-8"?>
+<p:sld xmlns:a="http://schemas.openxmlformats.org/drawingml/2006/main" xmlns:r="http://schemas.openxmlformats.org/officeDocument/2006/relationships" xmlns:p="http://schemas.openxmlformats.org/presentationml/2006/main">
+  <p:cSld>
+    <p:spTree>
+      <p:nvGrpSpPr>
+        <p:cNvPr id="1" name=""/>
+        <p:cNvGrpSpPr/>
+        <p:nvPr/>
+      </p:nvGrpSpPr>
+      <p:grpSpPr>
+        <a:xfrm>
+          <a:off x="0" y="0"/>
+          <a:ext cx="0" cy="0"/>
+          <a:chOff x="0" y="0"/>
+          <a:chExt cx="0" cy="0"/>
+        </a:xfrm>
+      </p:grpSpPr>
+      <p:sp>
+        <p:nvSpPr>
+          <p:cNvPr id="2" name="Title 1">
+            <a:extLst>
+              <a:ext uri="{FF2B5EF4-FFF2-40B4-BE49-F238E27FC236}">
+                <a16:creationId xmlns:a16="http://schemas.microsoft.com/office/drawing/2014/main" id="{F4C9BA9C-47AC-9A17-9A06-D1CC638D20CE}"/>
+              </a:ext>
+            </a:extLst>
+          </p:cNvPr>
+          <p:cNvSpPr>
+            <a:spLocks noGrp="1"/>
+          </p:cNvSpPr>
+          <p:nvPr>
+            <p:ph type="title"/>
+          </p:nvPr>
+        </p:nvSpPr>
+        <p:spPr/>
+        <p:txBody>
+          <a:bodyPr/>
+          <a:lstStyle/>
+          <a:p>
+            <a:endParaRPr lang="en-US"/>
+          </a:p>
+        </p:txBody>
+      </p:sp>
+      <p:sp>
+        <p:nvSpPr>
+          <p:cNvPr id="3" name="Content Placeholder 2">
+            <a:extLst>
+              <a:ext uri="{FF2B5EF4-FFF2-40B4-BE49-F238E27FC236}">
+                <a16:creationId xmlns:a16="http://schemas.microsoft.com/office/drawing/2014/main" id="{8FF73F1A-621B-973F-A2F7-87893A03B8EB}"/>
+              </a:ext>
+            </a:extLst>
+          </p:cNvPr>
+          <p:cNvSpPr>
+            <a:spLocks noGrp="1"/>
+          </p:cNvSpPr>
+          <p:nvPr>
+            <p:ph idx="1"/>
+          </p:nvPr>
+        </p:nvSpPr>
+        <p:spPr/>
+        <p:txBody>
+          <a:bodyPr/>
+          <a:lstStyle/>
+          <a:p>
+            <a:endParaRPr lang="en-US"/>
+          </a:p>
+        </p:txBody>
+      </p:sp>
+      <p:pic>
+        <p:nvPicPr>
+          <p:cNvPr id="4" name="Content Placeholder 4" descr="A screenshot of a computer&#10;&#10;Description automatically generated">
+            <a:extLst>
+              <a:ext uri="{FF2B5EF4-FFF2-40B4-BE49-F238E27FC236}">
+                <a16:creationId xmlns:a16="http://schemas.microsoft.com/office/drawing/2014/main" id="{D2EC76A3-02CD-C9FA-9B83-18D15D54D339}"/>
+              </a:ext>
+            </a:extLst>
+          </p:cNvPr>
+          <p:cNvPicPr>
+            <a:picLocks noChangeAspect="1"/>
+          </p:cNvPicPr>
+          <p:nvPr/>
+        </p:nvPicPr>
+        <p:blipFill>
+          <a:blip r:embed="rId2"/>
+          <a:stretch>
+            <a:fillRect/>
+          </a:stretch>
+        </p:blipFill>
+        <p:spPr>
+          <a:xfrm>
+            <a:off x="838200" y="1690688"/>
+            <a:ext cx="8015622" cy="4351338"/>
+          </a:xfrm>
+          <a:prstGeom prst="rect">
+            <a:avLst/>
+          </a:prstGeom>
+        </p:spPr>
+      </p:pic>
+    </p:spTree>
+    <p:extLst>
+      <p:ext uri="{BB962C8B-B14F-4D97-AF65-F5344CB8AC3E}">
+        <p14:creationId xmlns:p14="http://schemas.microsoft.com/office/powerpoint/2010/main" val="637842480"/>
+      </p:ext>
+    </p:extLst>
+  </p:cSld>
+  <p:clrMapOvr>
+    <a:masterClrMapping/>
+  </p:clrMapOvr>
+</p:sld>
+</file>
+
 <file path=ppt/slides/slide2.xml><?xml version="1.0" encoding="utf-8"?>
 <p:sld xmlns:a="http://schemas.openxmlformats.org/drawingml/2006/main" xmlns:r="http://schemas.openxmlformats.org/officeDocument/2006/relationships" xmlns:p="http://schemas.openxmlformats.org/presentationml/2006/main">
   <p:cSld>

</xml_diff>